<commit_message>
Add solution for task 2.5
</commit_message>
<xml_diff>
--- a/lab_2/task_3/task_3.pptx
+++ b/lab_2/task_3/task_3.pptx
@@ -3255,8 +3255,8 @@
         </p:nvSpPr>
         <p:spPr>
           <a:xfrm>
-            <a:off x="2483211" y="3222090"/>
-            <a:ext cx="1523794" cy="408882"/>
+            <a:off x="2649739" y="3222090"/>
+            <a:ext cx="1190738" cy="408882"/>
           </a:xfrm>
           <a:prstGeom prst="flowChartProcess">
             <a:avLst/>
@@ -3286,8 +3286,8 @@
               <a:t>l ← długość(</a:t>
             </a:r>
             <a:r>
-              <a:rPr lang="pl-PL" sz="1200" i="1" dirty="0" err="1"/>
-              <a:t>seed</a:t>
+              <a:rPr lang="pl-PL" sz="1200" i="1" dirty="0"/>
+              <a:t>x</a:t>
             </a:r>
             <a:r>
               <a:rPr lang="pl-PL" sz="1200" dirty="0"/>
@@ -3845,6 +3845,7 @@
             </a:extLst>
           </p:cNvPr>
           <p:cNvCxnSpPr>
+            <a:cxnSpLocks/>
             <a:stCxn id="13" idx="2"/>
             <a:endCxn id="21" idx="0"/>
           </p:cNvCxnSpPr>

</xml_diff>